<commit_message>
tdf#150020: pass transform and scale matrix for the table shadow primitive
Shadow scaling related bits in createEmbeddedShadowPrimitive, requires
the ObjectMatrix with scale and translate.

Pass these in for table shadow creation too.

Change-Id: I28c30fe49d3c90e3ca03fb5294ca97eb5ba22773
Reviewed-on: https://gerrit.libreoffice.org/c/core/+/150639
Tested-by: Jenkins
Reviewed-by: Sarper Akdemir <sarper.akdemir@collabora.com>
(cherry picked from commit fcf776a09a2c5cd692480c8ec4a678e3d04739c9)
Reviewed-on: https://gerrit.libreoffice.org/c/core/+/151613
Tested-by: Jenkins CollaboraOffice <jenkinscollaboraoffice@gmail.com>
</commit_message>
<xml_diff>
--- a/svx/qa/unit/data/tdf150020-shadow-alignment.pptx
+++ b/svx/qa/unit/data/tdf150020-shadow-alignment.pptx
@@ -1,14 +1,15 @@
 
 <file path=ppt/presentation.xml><?xml version="1.0" encoding="utf-8"?>
-<p:presentation xmlns:a="http://schemas.openxmlformats.org/drawingml/2006/main" xmlns:r="http://schemas.openxmlformats.org/officeDocument/2006/relationships" xmlns:p="http://schemas.openxmlformats.org/presentationml/2006/main" showSpecialPlsOnTitleSld="0" strictFirstAndLastChars="0" saveSubsetFonts="1">
+<p:presentation xmlns:a="http://schemas.openxmlformats.org/drawingml/2006/main" xmlns:r="http://schemas.openxmlformats.org/officeDocument/2006/relationships" xmlns:p="http://schemas.openxmlformats.org/presentationml/2006/main" showSpecialPlsOnTitleSld="0" removePersonalInfoOnSave="1" strictFirstAndLastChars="0" saveSubsetFonts="1">
   <p:sldMasterIdLst>
-    <p:sldMasterId id="2147483762" r:id="rId4"/>
+    <p:sldMasterId id="2147483762" r:id="rId1"/>
   </p:sldMasterIdLst>
   <p:notesMasterIdLst>
-    <p:notesMasterId r:id="rId6"/>
+    <p:notesMasterId r:id="rId4"/>
   </p:notesMasterIdLst>
   <p:sldIdLst>
-    <p:sldId id="2147470180" r:id="rId5"/>
+    <p:sldId id="2147470180" r:id="rId2"/>
+    <p:sldId id="2147470181" r:id="rId3"/>
   </p:sldIdLst>
   <p:sldSz cx="12192000" cy="6858000"/>
   <p:notesSz cx="9144000" cy="6858000"/>
@@ -125,27 +126,7 @@
 
 <file path=ppt/commentAuthors.xml><?xml version="1.0" encoding="utf-8"?>
 <p:cmAuthorLst xmlns:a="http://schemas.openxmlformats.org/drawingml/2006/main" xmlns:r="http://schemas.openxmlformats.org/officeDocument/2006/relationships" xmlns:p="http://schemas.openxmlformats.org/presentationml/2006/main">
-  <p:cmAuthor id="1" name="Michal Svec" initials="MS" lastIdx="2" clrIdx="0">
-    <p:extLst>
-      <p:ext uri="{19B8F6BF-5375-455C-9EA6-DF929625EA0E}">
-        <p15:presenceInfo xmlns:p15="http://schemas.microsoft.com/office/powerpoint/2012/main" userId="S::msvec@suse.com::e0a16f7c-14ff-4656-965a-4065c755279a" providerId="AD"/>
-      </p:ext>
-    </p:extLst>
-  </p:cmAuthor>
-  <p:cmAuthor id="2" name="Kate O'Twelftree" initials="KO" lastIdx="3" clrIdx="1">
-    <p:extLst>
-      <p:ext uri="{19B8F6BF-5375-455C-9EA6-DF929625EA0E}">
-        <p15:presenceInfo xmlns:p15="http://schemas.microsoft.com/office/powerpoint/2012/main" userId="S::kate.otwelftree@suse.com::a6548982-0042-47bc-800e-3be9eee93890" providerId="AD"/>
-      </p:ext>
-    </p:extLst>
-  </p:cmAuthor>
-  <p:cmAuthor id="3" name="Jeff Reser" initials="JR [2]" lastIdx="3" clrIdx="2">
-    <p:extLst>
-      <p:ext uri="{19B8F6BF-5375-455C-9EA6-DF929625EA0E}">
-        <p15:presenceInfo xmlns:p15="http://schemas.microsoft.com/office/powerpoint/2012/main" userId="Jeff Reser" providerId="None"/>
-      </p:ext>
-    </p:extLst>
-  </p:cmAuthor>
+  <p:cmAuthor id="4" name="Author" initials="A" lastIdx="0" clrIdx="3"/>
 </p:cmAuthorLst>
 </file>
 
@@ -242,7 +223,7 @@
           <a:p>
             <a:fld id="{D0B5CFFD-C28E-4F99-A0AE-37E23A3D8A38}" type="datetimeFigureOut">
               <a:rPr lang="en-US" smtClean="0"/>
-              <a:t>3/15/2023</a:t>
+              <a:t>4/19/2023</a:t>
             </a:fld>
             <a:endParaRPr lang="en-US"/>
           </a:p>
@@ -726,7 +707,7 @@
           <a:p>
             <a:fld id="{C764DE79-268F-4C1A-8933-263129D2AF90}" type="datetimeFigureOut">
               <a:rPr lang="en-US" dirty="0"/>
-              <a:t>3/15/2023</a:t>
+              <a:t>4/19/2023</a:t>
             </a:fld>
             <a:endParaRPr lang="en-US" dirty="0"/>
           </a:p>
@@ -894,7 +875,7 @@
           <a:p>
             <a:fld id="{C764DE79-268F-4C1A-8933-263129D2AF90}" type="datetimeFigureOut">
               <a:rPr lang="en-US" dirty="0"/>
-              <a:t>3/15/2023</a:t>
+              <a:t>4/19/2023</a:t>
             </a:fld>
             <a:endParaRPr lang="en-US" dirty="0"/>
           </a:p>
@@ -1072,7 +1053,7 @@
           <a:p>
             <a:fld id="{C764DE79-268F-4C1A-8933-263129D2AF90}" type="datetimeFigureOut">
               <a:rPr lang="en-US" dirty="0"/>
-              <a:t>3/15/2023</a:t>
+              <a:t>4/19/2023</a:t>
             </a:fld>
             <a:endParaRPr lang="en-US" dirty="0"/>
           </a:p>
@@ -1240,7 +1221,7 @@
           <a:p>
             <a:fld id="{C764DE79-268F-4C1A-8933-263129D2AF90}" type="datetimeFigureOut">
               <a:rPr lang="en-US" dirty="0"/>
-              <a:t>3/15/2023</a:t>
+              <a:t>4/19/2023</a:t>
             </a:fld>
             <a:endParaRPr lang="en-US" dirty="0"/>
           </a:p>
@@ -1485,7 +1466,7 @@
           <a:p>
             <a:fld id="{C764DE79-268F-4C1A-8933-263129D2AF90}" type="datetimeFigureOut">
               <a:rPr lang="en-US" dirty="0"/>
-              <a:t>3/15/2023</a:t>
+              <a:t>4/19/2023</a:t>
             </a:fld>
             <a:endParaRPr lang="en-US" dirty="0"/>
           </a:p>
@@ -1714,7 +1695,7 @@
           <a:p>
             <a:fld id="{C764DE79-268F-4C1A-8933-263129D2AF90}" type="datetimeFigureOut">
               <a:rPr lang="en-US" dirty="0"/>
-              <a:t>3/15/2023</a:t>
+              <a:t>4/19/2023</a:t>
             </a:fld>
             <a:endParaRPr lang="en-US" dirty="0"/>
           </a:p>
@@ -2078,7 +2059,7 @@
           <a:p>
             <a:fld id="{C764DE79-268F-4C1A-8933-263129D2AF90}" type="datetimeFigureOut">
               <a:rPr lang="en-US" dirty="0"/>
-              <a:t>3/15/2023</a:t>
+              <a:t>4/19/2023</a:t>
             </a:fld>
             <a:endParaRPr lang="en-US" dirty="0"/>
           </a:p>
@@ -2195,7 +2176,7 @@
           <a:p>
             <a:fld id="{C764DE79-268F-4C1A-8933-263129D2AF90}" type="datetimeFigureOut">
               <a:rPr lang="en-US" dirty="0"/>
-              <a:t>3/15/2023</a:t>
+              <a:t>4/19/2023</a:t>
             </a:fld>
             <a:endParaRPr lang="en-US" dirty="0"/>
           </a:p>
@@ -2290,7 +2271,7 @@
           <a:p>
             <a:fld id="{C764DE79-268F-4C1A-8933-263129D2AF90}" type="datetimeFigureOut">
               <a:rPr lang="en-US" dirty="0"/>
-              <a:t>3/15/2023</a:t>
+              <a:t>4/19/2023</a:t>
             </a:fld>
             <a:endParaRPr lang="en-US" dirty="0"/>
           </a:p>
@@ -2565,7 +2546,7 @@
           <a:p>
             <a:fld id="{C764DE79-268F-4C1A-8933-263129D2AF90}" type="datetimeFigureOut">
               <a:rPr lang="en-US" dirty="0"/>
-              <a:t>3/15/2023</a:t>
+              <a:t>4/19/2023</a:t>
             </a:fld>
             <a:endParaRPr lang="en-US" dirty="0"/>
           </a:p>
@@ -2817,7 +2798,7 @@
           <a:p>
             <a:fld id="{C764DE79-268F-4C1A-8933-263129D2AF90}" type="datetimeFigureOut">
               <a:rPr lang="en-US" dirty="0"/>
-              <a:t>3/15/2023</a:t>
+              <a:t>4/19/2023</a:t>
             </a:fld>
             <a:endParaRPr lang="en-US" dirty="0"/>
           </a:p>
@@ -3028,7 +3009,7 @@
           <a:p>
             <a:fld id="{C764DE79-268F-4C1A-8933-263129D2AF90}" type="datetimeFigureOut">
               <a:rPr lang="en-US" dirty="0"/>
-              <a:t>3/15/2023</a:t>
+              <a:t>4/19/2023</a:t>
             </a:fld>
             <a:endParaRPr lang="en-US" dirty="0"/>
           </a:p>
@@ -3450,7 +3431,7 @@
           <p:cNvPr id="9" name="Rectangle 8">
             <a:extLst>
               <a:ext uri="{FF2B5EF4-FFF2-40B4-BE49-F238E27FC236}">
-                <a16:creationId xmlns:a16="http://schemas.microsoft.com/office/drawing/2014/main" id="{C47F3FAD-C6B9-8C4F-8B30-A986CB23085B}"/>
+                <a16:creationId xmlns:a16="http://schemas.microsoft.com/office/drawing/2014/main" xmlns="" id="{C47F3FAD-C6B9-8C4F-8B30-A986CB23085B}"/>
               </a:ext>
             </a:extLst>
           </p:cNvPr>
@@ -3509,7 +3490,7 @@
           <p:cNvPr id="3" name="Rectangle 2">
             <a:extLst>
               <a:ext uri="{FF2B5EF4-FFF2-40B4-BE49-F238E27FC236}">
-                <a16:creationId xmlns:a16="http://schemas.microsoft.com/office/drawing/2014/main" id="{88DDFA2C-2F36-D968-40AA-A965EB5050B2}"/>
+                <a16:creationId xmlns:a16="http://schemas.microsoft.com/office/drawing/2014/main" xmlns="" id="{88DDFA2C-2F36-D968-40AA-A965EB5050B2}"/>
               </a:ext>
             </a:extLst>
           </p:cNvPr>
@@ -3570,7 +3551,7 @@
           <p:cNvPr id="6" name="Rectangle 5">
             <a:extLst>
               <a:ext uri="{FF2B5EF4-FFF2-40B4-BE49-F238E27FC236}">
-                <a16:creationId xmlns:a16="http://schemas.microsoft.com/office/drawing/2014/main" id="{E5CF6F59-E51B-CD7A-8641-C5945425ABB0}"/>
+                <a16:creationId xmlns:a16="http://schemas.microsoft.com/office/drawing/2014/main" xmlns="" id="{E5CF6F59-E51B-CD7A-8641-C5945425ABB0}"/>
               </a:ext>
             </a:extLst>
           </p:cNvPr>
@@ -3630,7 +3611,7 @@
           <p:cNvPr id="7" name="Rectangle 6">
             <a:extLst>
               <a:ext uri="{FF2B5EF4-FFF2-40B4-BE49-F238E27FC236}">
-                <a16:creationId xmlns:a16="http://schemas.microsoft.com/office/drawing/2014/main" id="{D65E77C1-ACF8-AE57-88B9-BF5B6370A169}"/>
+                <a16:creationId xmlns:a16="http://schemas.microsoft.com/office/drawing/2014/main" xmlns="" id="{D65E77C1-ACF8-AE57-88B9-BF5B6370A169}"/>
               </a:ext>
             </a:extLst>
           </p:cNvPr>
@@ -3690,7 +3671,7 @@
           <p:cNvPr id="8" name="Rectangle 7">
             <a:extLst>
               <a:ext uri="{FF2B5EF4-FFF2-40B4-BE49-F238E27FC236}">
-                <a16:creationId xmlns:a16="http://schemas.microsoft.com/office/drawing/2014/main" id="{7CC6C423-3B86-1DAC-AB41-08C8E613F55B}"/>
+                <a16:creationId xmlns:a16="http://schemas.microsoft.com/office/drawing/2014/main" xmlns="" id="{7CC6C423-3B86-1DAC-AB41-08C8E613F55B}"/>
               </a:ext>
             </a:extLst>
           </p:cNvPr>
@@ -3750,7 +3731,7 @@
           <p:cNvPr id="10" name="Rectangle 9">
             <a:extLst>
               <a:ext uri="{FF2B5EF4-FFF2-40B4-BE49-F238E27FC236}">
-                <a16:creationId xmlns:a16="http://schemas.microsoft.com/office/drawing/2014/main" id="{E990CAAE-5C57-8DBA-E430-5FB552F01E35}"/>
+                <a16:creationId xmlns:a16="http://schemas.microsoft.com/office/drawing/2014/main" xmlns="" id="{E990CAAE-5C57-8DBA-E430-5FB552F01E35}"/>
               </a:ext>
             </a:extLst>
           </p:cNvPr>
@@ -3810,7 +3791,7 @@
           <p:cNvPr id="11" name="Rectangle 10">
             <a:extLst>
               <a:ext uri="{FF2B5EF4-FFF2-40B4-BE49-F238E27FC236}">
-                <a16:creationId xmlns:a16="http://schemas.microsoft.com/office/drawing/2014/main" id="{68D7AF90-CF57-5DD8-35E1-595846CB654E}"/>
+                <a16:creationId xmlns:a16="http://schemas.microsoft.com/office/drawing/2014/main" xmlns="" id="{68D7AF90-CF57-5DD8-35E1-595846CB654E}"/>
               </a:ext>
             </a:extLst>
           </p:cNvPr>
@@ -3870,7 +3851,7 @@
           <p:cNvPr id="12" name="Rectangle 11">
             <a:extLst>
               <a:ext uri="{FF2B5EF4-FFF2-40B4-BE49-F238E27FC236}">
-                <a16:creationId xmlns:a16="http://schemas.microsoft.com/office/drawing/2014/main" id="{EE6D384D-5EC6-D1C6-2D2D-0864D8ECBAC3}"/>
+                <a16:creationId xmlns:a16="http://schemas.microsoft.com/office/drawing/2014/main" xmlns="" id="{EE6D384D-5EC6-D1C6-2D2D-0864D8ECBAC3}"/>
               </a:ext>
             </a:extLst>
           </p:cNvPr>
@@ -3930,7 +3911,7 @@
           <p:cNvPr id="13" name="Rectangle 12">
             <a:extLst>
               <a:ext uri="{FF2B5EF4-FFF2-40B4-BE49-F238E27FC236}">
-                <a16:creationId xmlns:a16="http://schemas.microsoft.com/office/drawing/2014/main" id="{03FC9DD4-D205-5738-9213-D75202669115}"/>
+                <a16:creationId xmlns:a16="http://schemas.microsoft.com/office/drawing/2014/main" xmlns="" id="{03FC9DD4-D205-5738-9213-D75202669115}"/>
               </a:ext>
             </a:extLst>
           </p:cNvPr>
@@ -4006,6 +3987,147 @@
       </p:transition>
     </mc:Fallback>
   </mc:AlternateContent>
+  <p:timing>
+    <p:tnLst>
+      <p:par>
+        <p:cTn id="1" dur="indefinite" restart="never" nodeType="tmRoot"/>
+      </p:par>
+    </p:tnLst>
+  </p:timing>
+</p:sld>
+</file>
+
+<file path=ppt/slides/slide2.xml><?xml version="1.0" encoding="utf-8"?>
+<p:sld xmlns:a="http://schemas.openxmlformats.org/drawingml/2006/main" xmlns:r="http://schemas.openxmlformats.org/officeDocument/2006/relationships" xmlns:p="http://schemas.openxmlformats.org/presentationml/2006/main">
+  <p:cSld>
+    <p:spTree>
+      <p:nvGrpSpPr>
+        <p:cNvPr id="1" name=""/>
+        <p:cNvGrpSpPr/>
+        <p:nvPr/>
+      </p:nvGrpSpPr>
+      <p:grpSpPr>
+        <a:xfrm>
+          <a:off x="0" y="0"/>
+          <a:ext cx="0" cy="0"/>
+          <a:chOff x="0" y="0"/>
+          <a:chExt cx="0" cy="0"/>
+        </a:xfrm>
+      </p:grpSpPr>
+      <p:graphicFrame>
+        <p:nvGraphicFramePr>
+          <p:cNvPr id="2" name="Table 1"/>
+          <p:cNvGraphicFramePr>
+            <a:graphicFrameLocks noGrp="1"/>
+          </p:cNvGraphicFramePr>
+          <p:nvPr>
+            <p:extLst>
+              <p:ext uri="{D42A27DB-BD31-4B8C-83A1-F6EECF244321}">
+                <p14:modId xmlns:p14="http://schemas.microsoft.com/office/powerpoint/2010/main" val="1132740224"/>
+              </p:ext>
+            </p:extLst>
+          </p:nvPr>
+        </p:nvGraphicFramePr>
+        <p:xfrm>
+          <a:off x="2172275" y="1915844"/>
+          <a:ext cx="8128000" cy="1665316"/>
+        </p:xfrm>
+        <a:graphic>
+          <a:graphicData uri="http://schemas.openxmlformats.org/drawingml/2006/table">
+            <a:tbl>
+              <a:tblPr firstRow="1" bandRow="1">
+                <a:effectLst>
+                  <a:outerShdw sx="130000" sy="130000" algn="ctr" rotWithShape="0">
+                    <a:prstClr val="black"/>
+                  </a:outerShdw>
+                </a:effectLst>
+                <a:tableStyleId>{5C22544A-7EE6-4342-B048-85BDC9FD1C3A}</a:tableStyleId>
+              </a:tblPr>
+              <a:tblGrid>
+                <a:gridCol w="4064000"/>
+                <a:gridCol w="4064000"/>
+              </a:tblGrid>
+              <a:tr h="832658">
+                <a:tc>
+                  <a:txBody>
+                    <a:bodyPr/>
+                    <a:lstStyle/>
+                    <a:p>
+                      <a:r>
+                        <a:rPr lang="tr-TR" dirty="0" smtClean="0"/>
+                        <a:t>Some</a:t>
+                      </a:r>
+                      <a:endParaRPr lang="en-US" dirty="0"/>
+                    </a:p>
+                  </a:txBody>
+                  <a:tcPr/>
+                </a:tc>
+                <a:tc>
+                  <a:txBody>
+                    <a:bodyPr/>
+                    <a:lstStyle/>
+                    <a:p>
+                      <a:r>
+                        <a:rPr lang="tr-TR" dirty="0" smtClean="0"/>
+                        <a:t>Table</a:t>
+                      </a:r>
+                      <a:endParaRPr lang="en-US" dirty="0"/>
+                    </a:p>
+                  </a:txBody>
+                  <a:tcPr/>
+                </a:tc>
+              </a:tr>
+              <a:tr h="832658">
+                <a:tc>
+                  <a:txBody>
+                    <a:bodyPr/>
+                    <a:lstStyle/>
+                    <a:p>
+                      <a:r>
+                        <a:rPr lang="tr-TR" dirty="0" smtClean="0"/>
+                        <a:t>With</a:t>
+                      </a:r>
+                      <a:endParaRPr lang="en-US" dirty="0"/>
+                    </a:p>
+                  </a:txBody>
+                  <a:tcPr/>
+                </a:tc>
+                <a:tc>
+                  <a:txBody>
+                    <a:bodyPr/>
+                    <a:lstStyle/>
+                    <a:p>
+                      <a:r>
+                        <a:rPr lang="tr-TR" baseline="0" dirty="0" smtClean="0"/>
+                        <a:t>Center shadow alignment</a:t>
+                      </a:r>
+                      <a:endParaRPr lang="en-US" dirty="0"/>
+                    </a:p>
+                  </a:txBody>
+                  <a:tcPr/>
+                </a:tc>
+              </a:tr>
+            </a:tbl>
+          </a:graphicData>
+        </a:graphic>
+      </p:graphicFrame>
+    </p:spTree>
+    <p:extLst>
+      <p:ext uri="{BB962C8B-B14F-4D97-AF65-F5344CB8AC3E}">
+        <p14:creationId xmlns:p14="http://schemas.microsoft.com/office/powerpoint/2010/main" val="4201615450"/>
+      </p:ext>
+    </p:extLst>
+  </p:cSld>
+  <p:clrMapOvr>
+    <a:masterClrMapping/>
+  </p:clrMapOvr>
+  <p:timing>
+    <p:tnLst>
+      <p:par>
+        <p:cTn id="1" dur="indefinite" restart="never" nodeType="tmRoot"/>
+      </p:par>
+    </p:tnLst>
+  </p:timing>
 </p:sld>
 </file>
 
@@ -4529,304 +4651,4 @@
     </a:ext>
   </a:extLst>
 </a:theme>
-</file>
-
-<file path=customXml/item1.xml><?xml version="1.0" encoding="utf-8"?>
-<?mso-contentType ?>
-<FormTemplates xmlns="http://schemas.microsoft.com/sharepoint/v3/contenttype/forms">
-  <Display>DocumentLibraryForm</Display>
-  <Edit>DocumentLibraryForm</Edit>
-  <New>DocumentLibraryForm</New>
-</FormTemplates>
-</file>
-
-<file path=customXml/item2.xml><?xml version="1.0" encoding="utf-8"?>
-<ct:contentTypeSchema xmlns:ct="http://schemas.microsoft.com/office/2006/metadata/contentType" xmlns:ma="http://schemas.microsoft.com/office/2006/metadata/properties/metaAttributes" ct:_="" ma:_="" ma:contentTypeName="Document" ma:contentTypeID="0x010100A7B260A5CDD0B945931DC8AD3570BA13" ma:contentTypeVersion="13" ma:contentTypeDescription="Create a new document." ma:contentTypeScope="" ma:versionID="7254518c94b6ba2e0c79faedacc2b41b">
-  <xsd:schema xmlns:xsd="http://www.w3.org/2001/XMLSchema" xmlns:xs="http://www.w3.org/2001/XMLSchema" xmlns:p="http://schemas.microsoft.com/office/2006/metadata/properties" xmlns:ns2="5187d7ca-9d49-4397-a7a6-4dffe3d83413" xmlns:ns3="d34cf168-afa1-4b77-9e8b-84c256c0c2e8" targetNamespace="http://schemas.microsoft.com/office/2006/metadata/properties" ma:root="true" ma:fieldsID="1836e9f31ad21eea84ec1faced46db8d" ns2:_="" ns3:_="">
-    <xsd:import namespace="5187d7ca-9d49-4397-a7a6-4dffe3d83413"/>
-    <xsd:import namespace="d34cf168-afa1-4b77-9e8b-84c256c0c2e8"/>
-    <xsd:element name="properties">
-      <xsd:complexType>
-        <xsd:sequence>
-          <xsd:element name="documentManagement">
-            <xsd:complexType>
-              <xsd:all>
-                <xsd:element ref="ns2:MediaServiceMetadata" minOccurs="0"/>
-                <xsd:element ref="ns2:MediaServiceFastMetadata" minOccurs="0"/>
-                <xsd:element ref="ns2:MediaServiceAutoTags" minOccurs="0"/>
-                <xsd:element ref="ns2:MediaServiceGenerationTime" minOccurs="0"/>
-                <xsd:element ref="ns2:MediaServiceEventHashCode" minOccurs="0"/>
-                <xsd:element ref="ns2:MediaServiceDateTaken" minOccurs="0"/>
-                <xsd:element ref="ns2:MediaServiceOCR" minOccurs="0"/>
-                <xsd:element ref="ns2:MediaServiceAutoKeyPoints" minOccurs="0"/>
-                <xsd:element ref="ns2:MediaServiceKeyPoints" minOccurs="0"/>
-                <xsd:element ref="ns3:SharedWithUsers" minOccurs="0"/>
-                <xsd:element ref="ns3:SharedWithDetails" minOccurs="0"/>
-                <xsd:element ref="ns2:MediaLengthInSeconds" minOccurs="0"/>
-                <xsd:element ref="ns2:MediaServiceLocation" minOccurs="0"/>
-              </xsd:all>
-            </xsd:complexType>
-          </xsd:element>
-        </xsd:sequence>
-      </xsd:complexType>
-    </xsd:element>
-  </xsd:schema>
-  <xsd:schema xmlns:xsd="http://www.w3.org/2001/XMLSchema" xmlns:xs="http://www.w3.org/2001/XMLSchema" xmlns:dms="http://schemas.microsoft.com/office/2006/documentManagement/types" xmlns:pc="http://schemas.microsoft.com/office/infopath/2007/PartnerControls" targetNamespace="5187d7ca-9d49-4397-a7a6-4dffe3d83413" elementFormDefault="qualified">
-    <xsd:import namespace="http://schemas.microsoft.com/office/2006/documentManagement/types"/>
-    <xsd:import namespace="http://schemas.microsoft.com/office/infopath/2007/PartnerControls"/>
-    <xsd:element name="MediaServiceMetadata" ma:index="8" nillable="true" ma:displayName="MediaServiceMetadata" ma:hidden="true" ma:internalName="MediaServiceMetadata" ma:readOnly="true">
-      <xsd:simpleType>
-        <xsd:restriction base="dms:Note"/>
-      </xsd:simpleType>
-    </xsd:element>
-    <xsd:element name="MediaServiceFastMetadata" ma:index="9" nillable="true" ma:displayName="MediaServiceFastMetadata" ma:hidden="true" ma:internalName="MediaServiceFastMetadata" ma:readOnly="true">
-      <xsd:simpleType>
-        <xsd:restriction base="dms:Note"/>
-      </xsd:simpleType>
-    </xsd:element>
-    <xsd:element name="MediaServiceAutoTags" ma:index="10" nillable="true" ma:displayName="Tags" ma:internalName="MediaServiceAutoTags" ma:readOnly="true">
-      <xsd:simpleType>
-        <xsd:restriction base="dms:Text"/>
-      </xsd:simpleType>
-    </xsd:element>
-    <xsd:element name="MediaServiceGenerationTime" ma:index="11" nillable="true" ma:displayName="MediaServiceGenerationTime" ma:hidden="true" ma:internalName="MediaServiceGenerationTime" ma:readOnly="true">
-      <xsd:simpleType>
-        <xsd:restriction base="dms:Text"/>
-      </xsd:simpleType>
-    </xsd:element>
-    <xsd:element name="MediaServiceEventHashCode" ma:index="12" nillable="true" ma:displayName="MediaServiceEventHashCode" ma:hidden="true" ma:internalName="MediaServiceEventHashCode" ma:readOnly="true">
-      <xsd:simpleType>
-        <xsd:restriction base="dms:Text"/>
-      </xsd:simpleType>
-    </xsd:element>
-    <xsd:element name="MediaServiceDateTaken" ma:index="13" nillable="true" ma:displayName="MediaServiceDateTaken" ma:hidden="true" ma:internalName="MediaServiceDateTaken" ma:readOnly="true">
-      <xsd:simpleType>
-        <xsd:restriction base="dms:Text"/>
-      </xsd:simpleType>
-    </xsd:element>
-    <xsd:element name="MediaServiceOCR" ma:index="14" nillable="true" ma:displayName="Extracted Text" ma:internalName="MediaServiceOCR" ma:readOnly="true">
-      <xsd:simpleType>
-        <xsd:restriction base="dms:Note">
-          <xsd:maxLength value="255"/>
-        </xsd:restriction>
-      </xsd:simpleType>
-    </xsd:element>
-    <xsd:element name="MediaServiceAutoKeyPoints" ma:index="15" nillable="true" ma:displayName="MediaServiceAutoKeyPoints" ma:hidden="true" ma:internalName="MediaServiceAutoKeyPoints" ma:readOnly="true">
-      <xsd:simpleType>
-        <xsd:restriction base="dms:Note"/>
-      </xsd:simpleType>
-    </xsd:element>
-    <xsd:element name="MediaServiceKeyPoints" ma:index="16" nillable="true" ma:displayName="KeyPoints" ma:internalName="MediaServiceKeyPoints" ma:readOnly="true">
-      <xsd:simpleType>
-        <xsd:restriction base="dms:Note">
-          <xsd:maxLength value="255"/>
-        </xsd:restriction>
-      </xsd:simpleType>
-    </xsd:element>
-    <xsd:element name="MediaLengthInSeconds" ma:index="19" nillable="true" ma:displayName="Length (seconds)" ma:internalName="MediaLengthInSeconds" ma:readOnly="true">
-      <xsd:simpleType>
-        <xsd:restriction base="dms:Unknown"/>
-      </xsd:simpleType>
-    </xsd:element>
-    <xsd:element name="MediaServiceLocation" ma:index="20" nillable="true" ma:displayName="Location" ma:internalName="MediaServiceLocation" ma:readOnly="true">
-      <xsd:simpleType>
-        <xsd:restriction base="dms:Text"/>
-      </xsd:simpleType>
-    </xsd:element>
-  </xsd:schema>
-  <xsd:schema xmlns:xsd="http://www.w3.org/2001/XMLSchema" xmlns:xs="http://www.w3.org/2001/XMLSchema" xmlns:dms="http://schemas.microsoft.com/office/2006/documentManagement/types" xmlns:pc="http://schemas.microsoft.com/office/infopath/2007/PartnerControls" targetNamespace="d34cf168-afa1-4b77-9e8b-84c256c0c2e8" elementFormDefault="qualified">
-    <xsd:import namespace="http://schemas.microsoft.com/office/2006/documentManagement/types"/>
-    <xsd:import namespace="http://schemas.microsoft.com/office/infopath/2007/PartnerControls"/>
-    <xsd:element name="SharedWithUsers" ma:index="17" nillable="true" ma:displayName="Shared With" ma:internalName="SharedWithUsers" ma:readOnly="true">
-      <xsd:complexType>
-        <xsd:complexContent>
-          <xsd:extension base="dms:UserMulti">
-            <xsd:sequence>
-              <xsd:element name="UserInfo" minOccurs="0" maxOccurs="unbounded">
-                <xsd:complexType>
-                  <xsd:sequence>
-                    <xsd:element name="DisplayName" type="xsd:string" minOccurs="0"/>
-                    <xsd:element name="AccountId" type="dms:UserId" minOccurs="0" nillable="true"/>
-                    <xsd:element name="AccountType" type="xsd:string" minOccurs="0"/>
-                  </xsd:sequence>
-                </xsd:complexType>
-              </xsd:element>
-            </xsd:sequence>
-          </xsd:extension>
-        </xsd:complexContent>
-      </xsd:complexType>
-    </xsd:element>
-    <xsd:element name="SharedWithDetails" ma:index="18" nillable="true" ma:displayName="Shared With Details" ma:internalName="SharedWithDetails" ma:readOnly="true">
-      <xsd:simpleType>
-        <xsd:restriction base="dms:Note">
-          <xsd:maxLength value="255"/>
-        </xsd:restriction>
-      </xsd:simpleType>
-    </xsd:element>
-  </xsd:schema>
-  <xsd:schema xmlns="http://schemas.openxmlformats.org/package/2006/metadata/core-properties" xmlns:xsd="http://www.w3.org/2001/XMLSchema" xmlns:xsi="http://www.w3.org/2001/XMLSchema-instance" xmlns:dc="http://purl.org/dc/elements/1.1/" xmlns:dcterms="http://purl.org/dc/terms/" xmlns:odoc="http://schemas.microsoft.com/internal/obd" targetNamespace="http://schemas.openxmlformats.org/package/2006/metadata/core-properties" elementFormDefault="qualified" attributeFormDefault="unqualified" blockDefault="#all">
-    <xsd:import namespace="http://purl.org/dc/elements/1.1/" schemaLocation="http://dublincore.org/schemas/xmls/qdc/2003/04/02/dc.xsd"/>
-    <xsd:import namespace="http://purl.org/dc/terms/" schemaLocation="http://dublincore.org/schemas/xmls/qdc/2003/04/02/dcterms.xsd"/>
-    <xsd:element name="coreProperties" type="CT_coreProperties"/>
-    <xsd:complexType name="CT_coreProperties">
-      <xsd:all>
-        <xsd:element ref="dc:creator" minOccurs="0" maxOccurs="1"/>
-        <xsd:element ref="dcterms:created" minOccurs="0" maxOccurs="1"/>
-        <xsd:element ref="dc:identifier" minOccurs="0" maxOccurs="1"/>
-        <xsd:element name="contentType" minOccurs="0" maxOccurs="1" type="xsd:string" ma:index="0" ma:displayName="Content Type"/>
-        <xsd:element ref="dc:title" minOccurs="0" maxOccurs="1" ma:index="4" ma:displayName="Title"/>
-        <xsd:element ref="dc:subject" minOccurs="0" maxOccurs="1"/>
-        <xsd:element ref="dc:description" minOccurs="0" maxOccurs="1"/>
-        <xsd:element name="keywords" minOccurs="0" maxOccurs="1" type="xsd:string"/>
-        <xsd:element ref="dc:language" minOccurs="0" maxOccurs="1"/>
-        <xsd:element name="category" minOccurs="0" maxOccurs="1" type="xsd:string"/>
-        <xsd:element name="version" minOccurs="0" maxOccurs="1" type="xsd:string"/>
-        <xsd:element name="revision" minOccurs="0" maxOccurs="1" type="xsd:string">
-          <xsd:annotation>
-            <xsd:documentation>
-                        This value indicates the number of saves or revisions. The application is responsible for updating this value after each revision.
-                    </xsd:documentation>
-          </xsd:annotation>
-        </xsd:element>
-        <xsd:element name="lastModifiedBy" minOccurs="0" maxOccurs="1" type="xsd:string"/>
-        <xsd:element ref="dcterms:modified" minOccurs="0" maxOccurs="1"/>
-        <xsd:element name="contentStatus" minOccurs="0" maxOccurs="1" type="xsd:string"/>
-      </xsd:all>
-    </xsd:complexType>
-  </xsd:schema>
-  <xs:schema xmlns:pc="http://schemas.microsoft.com/office/infopath/2007/PartnerControls" xmlns:xs="http://www.w3.org/2001/XMLSchema" targetNamespace="http://schemas.microsoft.com/office/infopath/2007/PartnerControls" elementFormDefault="qualified" attributeFormDefault="unqualified">
-    <xs:element name="Person">
-      <xs:complexType>
-        <xs:sequence>
-          <xs:element ref="pc:DisplayName" minOccurs="0"/>
-          <xs:element ref="pc:AccountId" minOccurs="0"/>
-          <xs:element ref="pc:AccountType" minOccurs="0"/>
-        </xs:sequence>
-      </xs:complexType>
-    </xs:element>
-    <xs:element name="DisplayName" type="xs:string"/>
-    <xs:element name="AccountId" type="xs:string"/>
-    <xs:element name="AccountType" type="xs:string"/>
-    <xs:element name="BDCAssociatedEntity">
-      <xs:complexType>
-        <xs:sequence>
-          <xs:element ref="pc:BDCEntity" minOccurs="0" maxOccurs="unbounded"/>
-        </xs:sequence>
-        <xs:attribute ref="pc:EntityNamespace"/>
-        <xs:attribute ref="pc:EntityName"/>
-        <xs:attribute ref="pc:SystemInstanceName"/>
-        <xs:attribute ref="pc:AssociationName"/>
-      </xs:complexType>
-    </xs:element>
-    <xs:attribute name="EntityNamespace" type="xs:string"/>
-    <xs:attribute name="EntityName" type="xs:string"/>
-    <xs:attribute name="SystemInstanceName" type="xs:string"/>
-    <xs:attribute name="AssociationName" type="xs:string"/>
-    <xs:element name="BDCEntity">
-      <xs:complexType>
-        <xs:sequence>
-          <xs:element ref="pc:EntityDisplayName" minOccurs="0"/>
-          <xs:element ref="pc:EntityInstanceReference" minOccurs="0"/>
-          <xs:element ref="pc:EntityId1" minOccurs="0"/>
-          <xs:element ref="pc:EntityId2" minOccurs="0"/>
-          <xs:element ref="pc:EntityId3" minOccurs="0"/>
-          <xs:element ref="pc:EntityId4" minOccurs="0"/>
-          <xs:element ref="pc:EntityId5" minOccurs="0"/>
-        </xs:sequence>
-      </xs:complexType>
-    </xs:element>
-    <xs:element name="EntityDisplayName" type="xs:string"/>
-    <xs:element name="EntityInstanceReference" type="xs:string"/>
-    <xs:element name="EntityId1" type="xs:string"/>
-    <xs:element name="EntityId2" type="xs:string"/>
-    <xs:element name="EntityId3" type="xs:string"/>
-    <xs:element name="EntityId4" type="xs:string"/>
-    <xs:element name="EntityId5" type="xs:string"/>
-    <xs:element name="Terms">
-      <xs:complexType>
-        <xs:sequence>
-          <xs:element ref="pc:TermInfo" minOccurs="0" maxOccurs="unbounded"/>
-        </xs:sequence>
-      </xs:complexType>
-    </xs:element>
-    <xs:element name="TermInfo">
-      <xs:complexType>
-        <xs:sequence>
-          <xs:element ref="pc:TermName" minOccurs="0"/>
-          <xs:element ref="pc:TermId" minOccurs="0"/>
-        </xs:sequence>
-      </xs:complexType>
-    </xs:element>
-    <xs:element name="TermName" type="xs:string"/>
-    <xs:element name="TermId" type="xs:string"/>
-  </xs:schema>
-</ct:contentTypeSchema>
-</file>
-
-<file path=customXml/item3.xml><?xml version="1.0" encoding="utf-8"?>
-<p:properties xmlns:p="http://schemas.microsoft.com/office/2006/metadata/properties" xmlns:xsi="http://www.w3.org/2001/XMLSchema-instance" xmlns:pc="http://schemas.microsoft.com/office/infopath/2007/PartnerControls">
-  <documentManagement>
-    <SharedWithUsers xmlns="d34cf168-afa1-4b77-9e8b-84c256c0c2e8">
-      <UserInfo>
-        <DisplayName>Matthias Eckermann</DisplayName>
-        <AccountId>367</AccountId>
-        <AccountType/>
-      </UserInfo>
-      <UserInfo>
-        <DisplayName>Thore Bahr</DisplayName>
-        <AccountId>142</AccountId>
-        <AccountType/>
-      </UserInfo>
-      <UserInfo>
-        <DisplayName>Stefan Behlert</DisplayName>
-        <AccountId>188</AccountId>
-        <AccountType/>
-      </UserInfo>
-    </SharedWithUsers>
-  </documentManagement>
-</p:properties>
-</file>
-
-<file path=customXml/itemProps1.xml><?xml version="1.0" encoding="utf-8"?>
-<ds:datastoreItem xmlns:ds="http://schemas.openxmlformats.org/officeDocument/2006/customXml" ds:itemID="{43D228E4-0704-48AB-A5B4-085B844E4893}">
-  <ds:schemaRefs>
-    <ds:schemaRef ds:uri="http://schemas.microsoft.com/sharepoint/v3/contenttype/forms"/>
-  </ds:schemaRefs>
-</ds:datastoreItem>
-</file>
-
-<file path=customXml/itemProps2.xml><?xml version="1.0" encoding="utf-8"?>
-<ds:datastoreItem xmlns:ds="http://schemas.openxmlformats.org/officeDocument/2006/customXml" ds:itemID="{0ADFEC51-B26E-4D98-A884-626ACDC4A582}">
-  <ds:schemaRefs>
-    <ds:schemaRef ds:uri="5187d7ca-9d49-4397-a7a6-4dffe3d83413"/>
-    <ds:schemaRef ds:uri="d34cf168-afa1-4b77-9e8b-84c256c0c2e8"/>
-    <ds:schemaRef ds:uri="http://purl.org/dc/elements/1.1/"/>
-    <ds:schemaRef ds:uri="http://purl.org/dc/terms/"/>
-    <ds:schemaRef ds:uri="http://schemas.microsoft.com/internal/obd"/>
-    <ds:schemaRef ds:uri="http://schemas.microsoft.com/office/2006/documentManagement/types"/>
-    <ds:schemaRef ds:uri="http://schemas.microsoft.com/office/2006/metadata/contentType"/>
-    <ds:schemaRef ds:uri="http://schemas.microsoft.com/office/2006/metadata/properties"/>
-    <ds:schemaRef ds:uri="http://schemas.microsoft.com/office/2006/metadata/properties/metaAttributes"/>
-    <ds:schemaRef ds:uri="http://schemas.microsoft.com/office/infopath/2007/PartnerControls"/>
-    <ds:schemaRef ds:uri="http://schemas.openxmlformats.org/package/2006/metadata/core-properties"/>
-    <ds:schemaRef ds:uri="http://www.w3.org/2001/XMLSchema"/>
-  </ds:schemaRefs>
-</ds:datastoreItem>
-</file>
-
-<file path=customXml/itemProps3.xml><?xml version="1.0" encoding="utf-8"?>
-<ds:datastoreItem xmlns:ds="http://schemas.openxmlformats.org/officeDocument/2006/customXml" ds:itemID="{BD3C6682-A717-4DEF-A002-EA59B5040EB5}">
-  <ds:schemaRefs>
-    <ds:schemaRef ds:uri="http://schemas.microsoft.com/office/2006/documentManagement/types"/>
-    <ds:schemaRef ds:uri="http://www.w3.org/XML/1998/namespace"/>
-    <ds:schemaRef ds:uri="http://schemas.microsoft.com/office/infopath/2007/PartnerControls"/>
-    <ds:schemaRef ds:uri="http://schemas.openxmlformats.org/package/2006/metadata/core-properties"/>
-    <ds:schemaRef ds:uri="http://purl.org/dc/dcmitype/"/>
-    <ds:schemaRef ds:uri="http://purl.org/dc/elements/1.1/"/>
-    <ds:schemaRef ds:uri="http://purl.org/dc/terms/"/>
-    <ds:schemaRef ds:uri="d34cf168-afa1-4b77-9e8b-84c256c0c2e8"/>
-    <ds:schemaRef ds:uri="5187d7ca-9d49-4397-a7a6-4dffe3d83413"/>
-    <ds:schemaRef ds:uri="http://schemas.microsoft.com/office/2006/metadata/properties"/>
-  </ds:schemaRefs>
-</ds:datastoreItem>
 </file>
</xml_diff>